<commit_message>
Getting a "at a glance" overview
</commit_message>
<xml_diff>
--- a/Documentation/Architecture/Diagrams.pptx
+++ b/Documentation/Architecture/Diagrams.pptx
@@ -6,6 +6,7 @@
   </p:sldMasterIdLst>
   <p:sldIdLst>
     <p:sldId id="256" r:id="rId2"/>
+    <p:sldId id="257" r:id="rId3"/>
   </p:sldIdLst>
   <p:sldSz cx="12192000" cy="6858000"/>
   <p:notesSz cx="6858000" cy="9144000"/>
@@ -243,7 +244,7 @@
           <a:p>
             <a:fld id="{0A886EC6-37D1-B94B-96F2-A65E1088196B}" type="datetimeFigureOut">
               <a:rPr lang="en-US" smtClean="0"/>
-              <a:t>9/10/17</a:t>
+              <a:t>9/21/17</a:t>
             </a:fld>
             <a:endParaRPr lang="en-US"/>
           </a:p>
@@ -413,7 +414,7 @@
           <a:p>
             <a:fld id="{0A886EC6-37D1-B94B-96F2-A65E1088196B}" type="datetimeFigureOut">
               <a:rPr lang="en-US" smtClean="0"/>
-              <a:t>9/10/17</a:t>
+              <a:t>9/21/17</a:t>
             </a:fld>
             <a:endParaRPr lang="en-US"/>
           </a:p>
@@ -593,7 +594,7 @@
           <a:p>
             <a:fld id="{0A886EC6-37D1-B94B-96F2-A65E1088196B}" type="datetimeFigureOut">
               <a:rPr lang="en-US" smtClean="0"/>
-              <a:t>9/10/17</a:t>
+              <a:t>9/21/17</a:t>
             </a:fld>
             <a:endParaRPr lang="en-US"/>
           </a:p>
@@ -763,7 +764,7 @@
           <a:p>
             <a:fld id="{0A886EC6-37D1-B94B-96F2-A65E1088196B}" type="datetimeFigureOut">
               <a:rPr lang="en-US" smtClean="0"/>
-              <a:t>9/10/17</a:t>
+              <a:t>9/21/17</a:t>
             </a:fld>
             <a:endParaRPr lang="en-US"/>
           </a:p>
@@ -1009,7 +1010,7 @@
           <a:p>
             <a:fld id="{0A886EC6-37D1-B94B-96F2-A65E1088196B}" type="datetimeFigureOut">
               <a:rPr lang="en-US" smtClean="0"/>
-              <a:t>9/10/17</a:t>
+              <a:t>9/21/17</a:t>
             </a:fld>
             <a:endParaRPr lang="en-US"/>
           </a:p>
@@ -1241,7 +1242,7 @@
           <a:p>
             <a:fld id="{0A886EC6-37D1-B94B-96F2-A65E1088196B}" type="datetimeFigureOut">
               <a:rPr lang="en-US" smtClean="0"/>
-              <a:t>9/10/17</a:t>
+              <a:t>9/21/17</a:t>
             </a:fld>
             <a:endParaRPr lang="en-US"/>
           </a:p>
@@ -1608,7 +1609,7 @@
           <a:p>
             <a:fld id="{0A886EC6-37D1-B94B-96F2-A65E1088196B}" type="datetimeFigureOut">
               <a:rPr lang="en-US" smtClean="0"/>
-              <a:t>9/10/17</a:t>
+              <a:t>9/21/17</a:t>
             </a:fld>
             <a:endParaRPr lang="en-US"/>
           </a:p>
@@ -1726,7 +1727,7 @@
           <a:p>
             <a:fld id="{0A886EC6-37D1-B94B-96F2-A65E1088196B}" type="datetimeFigureOut">
               <a:rPr lang="en-US" smtClean="0"/>
-              <a:t>9/10/17</a:t>
+              <a:t>9/21/17</a:t>
             </a:fld>
             <a:endParaRPr lang="en-US"/>
           </a:p>
@@ -1821,7 +1822,7 @@
           <a:p>
             <a:fld id="{0A886EC6-37D1-B94B-96F2-A65E1088196B}" type="datetimeFigureOut">
               <a:rPr lang="en-US" smtClean="0"/>
-              <a:t>9/10/17</a:t>
+              <a:t>9/21/17</a:t>
             </a:fld>
             <a:endParaRPr lang="en-US"/>
           </a:p>
@@ -2098,7 +2099,7 @@
           <a:p>
             <a:fld id="{0A886EC6-37D1-B94B-96F2-A65E1088196B}" type="datetimeFigureOut">
               <a:rPr lang="en-US" smtClean="0"/>
-              <a:t>9/10/17</a:t>
+              <a:t>9/21/17</a:t>
             </a:fld>
             <a:endParaRPr lang="en-US"/>
           </a:p>
@@ -2351,7 +2352,7 @@
           <a:p>
             <a:fld id="{0A886EC6-37D1-B94B-96F2-A65E1088196B}" type="datetimeFigureOut">
               <a:rPr lang="en-US" smtClean="0"/>
-              <a:t>9/10/17</a:t>
+              <a:t>9/21/17</a:t>
             </a:fld>
             <a:endParaRPr lang="en-US"/>
           </a:p>
@@ -2564,7 +2565,7 @@
           <a:p>
             <a:fld id="{0A886EC6-37D1-B94B-96F2-A65E1088196B}" type="datetimeFigureOut">
               <a:rPr lang="en-US" smtClean="0"/>
-              <a:t>9/10/17</a:t>
+              <a:t>9/21/17</a:t>
             </a:fld>
             <a:endParaRPr lang="en-US"/>
           </a:p>
@@ -3374,6 +3375,1095 @@
 </p:sld>
 </file>
 
+<file path=ppt/slides/slide2.xml><?xml version="1.0" encoding="utf-8"?>
+<p:sld xmlns:a="http://schemas.openxmlformats.org/drawingml/2006/main" xmlns:r="http://schemas.openxmlformats.org/officeDocument/2006/relationships" xmlns:p="http://schemas.openxmlformats.org/presentationml/2006/main">
+  <p:cSld>
+    <p:spTree>
+      <p:nvGrpSpPr>
+        <p:cNvPr id="1" name=""/>
+        <p:cNvGrpSpPr/>
+        <p:nvPr/>
+      </p:nvGrpSpPr>
+      <p:grpSpPr>
+        <a:xfrm>
+          <a:off x="0" y="0"/>
+          <a:ext cx="0" cy="0"/>
+          <a:chOff x="0" y="0"/>
+          <a:chExt cx="0" cy="0"/>
+        </a:xfrm>
+      </p:grpSpPr>
+      <p:sp>
+        <p:nvSpPr>
+          <p:cNvPr id="5" name="Rounded Rectangle 4"/>
+          <p:cNvSpPr/>
+          <p:nvPr/>
+        </p:nvSpPr>
+        <p:spPr>
+          <a:xfrm>
+            <a:off x="2257425" y="1211884"/>
+            <a:ext cx="4843463" cy="1002678"/>
+          </a:xfrm>
+          <a:prstGeom prst="roundRect">
+            <a:avLst/>
+          </a:prstGeom>
+          <a:noFill/>
+          <a:ln>
+            <a:prstDash val="dash"/>
+          </a:ln>
+        </p:spPr>
+        <p:style>
+          <a:lnRef idx="2">
+            <a:schemeClr val="accent1">
+              <a:shade val="50000"/>
+            </a:schemeClr>
+          </a:lnRef>
+          <a:fillRef idx="1">
+            <a:schemeClr val="accent1"/>
+          </a:fillRef>
+          <a:effectRef idx="0">
+            <a:schemeClr val="accent1"/>
+          </a:effectRef>
+          <a:fontRef idx="minor">
+            <a:schemeClr val="lt1"/>
+          </a:fontRef>
+        </p:style>
+        <p:txBody>
+          <a:bodyPr rtlCol="0" anchor="t" anchorCtr="0"/>
+          <a:lstStyle/>
+          <a:p>
+            <a:r>
+              <a:rPr lang="en-US" dirty="0" smtClean="0">
+                <a:solidFill>
+                  <a:schemeClr val="tx1"/>
+                </a:solidFill>
+              </a:rPr>
+              <a:t>Frontend (Web)</a:t>
+            </a:r>
+            <a:endParaRPr lang="en-US" dirty="0">
+              <a:solidFill>
+                <a:schemeClr val="tx1"/>
+              </a:solidFill>
+            </a:endParaRPr>
+          </a:p>
+        </p:txBody>
+      </p:sp>
+      <p:sp>
+        <p:nvSpPr>
+          <p:cNvPr id="8" name="Rounded Rectangle 7"/>
+          <p:cNvSpPr/>
+          <p:nvPr/>
+        </p:nvSpPr>
+        <p:spPr>
+          <a:xfrm>
+            <a:off x="2257424" y="2338386"/>
+            <a:ext cx="4843464" cy="3390902"/>
+          </a:xfrm>
+          <a:prstGeom prst="roundRect">
+            <a:avLst/>
+          </a:prstGeom>
+          <a:noFill/>
+          <a:ln>
+            <a:prstDash val="dash"/>
+          </a:ln>
+        </p:spPr>
+        <p:style>
+          <a:lnRef idx="2">
+            <a:schemeClr val="accent1">
+              <a:shade val="50000"/>
+            </a:schemeClr>
+          </a:lnRef>
+          <a:fillRef idx="1">
+            <a:schemeClr val="accent1"/>
+          </a:fillRef>
+          <a:effectRef idx="0">
+            <a:schemeClr val="accent1"/>
+          </a:effectRef>
+          <a:fontRef idx="minor">
+            <a:schemeClr val="lt1"/>
+          </a:fontRef>
+        </p:style>
+        <p:txBody>
+          <a:bodyPr rtlCol="0" anchor="t" anchorCtr="0"/>
+          <a:lstStyle/>
+          <a:p>
+            <a:r>
+              <a:rPr lang="en-US" dirty="0" smtClean="0">
+                <a:solidFill>
+                  <a:schemeClr val="tx1"/>
+                </a:solidFill>
+              </a:rPr>
+              <a:t>Backend</a:t>
+            </a:r>
+            <a:endParaRPr lang="en-US" dirty="0">
+              <a:solidFill>
+                <a:schemeClr val="tx1"/>
+              </a:solidFill>
+            </a:endParaRPr>
+          </a:p>
+        </p:txBody>
+      </p:sp>
+      <p:sp>
+        <p:nvSpPr>
+          <p:cNvPr id="9" name="Rectangle 8"/>
+          <p:cNvSpPr/>
+          <p:nvPr/>
+        </p:nvSpPr>
+        <p:spPr>
+          <a:xfrm>
+            <a:off x="5479491" y="2842547"/>
+            <a:ext cx="1393031" cy="364331"/>
+          </a:xfrm>
+          <a:prstGeom prst="rect">
+            <a:avLst/>
+          </a:prstGeom>
+        </p:spPr>
+        <p:style>
+          <a:lnRef idx="2">
+            <a:schemeClr val="accent1">
+              <a:shade val="50000"/>
+            </a:schemeClr>
+          </a:lnRef>
+          <a:fillRef idx="1">
+            <a:schemeClr val="accent1"/>
+          </a:fillRef>
+          <a:effectRef idx="0">
+            <a:schemeClr val="accent1"/>
+          </a:effectRef>
+          <a:fontRef idx="minor">
+            <a:schemeClr val="lt1"/>
+          </a:fontRef>
+        </p:style>
+        <p:txBody>
+          <a:bodyPr rtlCol="0" anchor="ctr"/>
+          <a:lstStyle/>
+          <a:p>
+            <a:pPr algn="ctr"/>
+            <a:r>
+              <a:rPr lang="en-US" sz="1400" dirty="0" smtClean="0"/>
+              <a:t>Command</a:t>
+            </a:r>
+          </a:p>
+          <a:p>
+            <a:pPr algn="ctr"/>
+            <a:r>
+              <a:rPr lang="en-US" sz="1400" dirty="0" smtClean="0"/>
+              <a:t>Controller</a:t>
+            </a:r>
+            <a:endParaRPr lang="en-US" sz="1400" dirty="0"/>
+          </a:p>
+        </p:txBody>
+      </p:sp>
+      <p:sp>
+        <p:nvSpPr>
+          <p:cNvPr id="11" name="Folded Corner 10"/>
+          <p:cNvSpPr/>
+          <p:nvPr/>
+        </p:nvSpPr>
+        <p:spPr>
+          <a:xfrm>
+            <a:off x="7167093" y="2681764"/>
+            <a:ext cx="1197056" cy="434379"/>
+          </a:xfrm>
+          <a:prstGeom prst="foldedCorner">
+            <a:avLst/>
+          </a:prstGeom>
+          <a:solidFill>
+            <a:srgbClr val="FFFF00"/>
+          </a:solidFill>
+        </p:spPr>
+        <p:style>
+          <a:lnRef idx="2">
+            <a:schemeClr val="accent1">
+              <a:shade val="50000"/>
+            </a:schemeClr>
+          </a:lnRef>
+          <a:fillRef idx="1">
+            <a:schemeClr val="accent1"/>
+          </a:fillRef>
+          <a:effectRef idx="0">
+            <a:schemeClr val="accent1"/>
+          </a:effectRef>
+          <a:fontRef idx="minor">
+            <a:schemeClr val="lt1"/>
+          </a:fontRef>
+        </p:style>
+        <p:txBody>
+          <a:bodyPr rtlCol="0" anchor="ctr"/>
+          <a:lstStyle/>
+          <a:p>
+            <a:pPr algn="ctr"/>
+            <a:r>
+              <a:rPr lang="en-US" sz="1100" dirty="0" smtClean="0">
+                <a:solidFill>
+                  <a:schemeClr val="tx1"/>
+                </a:solidFill>
+              </a:rPr>
+              <a:t>Validation</a:t>
+            </a:r>
+            <a:endParaRPr lang="en-US" sz="1100" dirty="0">
+              <a:solidFill>
+                <a:schemeClr val="tx1"/>
+              </a:solidFill>
+            </a:endParaRPr>
+          </a:p>
+          <a:p>
+            <a:pPr algn="ctr"/>
+            <a:r>
+              <a:rPr lang="en-US" sz="1100" dirty="0" smtClean="0">
+                <a:solidFill>
+                  <a:schemeClr val="tx1"/>
+                </a:solidFill>
+              </a:rPr>
+              <a:t>Authorization</a:t>
+            </a:r>
+          </a:p>
+        </p:txBody>
+      </p:sp>
+      <p:cxnSp>
+        <p:nvCxnSpPr>
+          <p:cNvPr id="12" name="Straight Connector 11"/>
+          <p:cNvCxnSpPr>
+            <a:stCxn id="9" idx="3"/>
+            <a:endCxn id="11" idx="1"/>
+          </p:cNvCxnSpPr>
+          <p:nvPr/>
+        </p:nvCxnSpPr>
+        <p:spPr>
+          <a:xfrm flipV="1">
+            <a:off x="6872522" y="2898954"/>
+            <a:ext cx="294571" cy="125759"/>
+          </a:xfrm>
+          <a:prstGeom prst="line">
+            <a:avLst/>
+          </a:prstGeom>
+          <a:ln w="9525">
+            <a:prstDash val="sysDash"/>
+          </a:ln>
+        </p:spPr>
+        <p:style>
+          <a:lnRef idx="1">
+            <a:schemeClr val="accent1"/>
+          </a:lnRef>
+          <a:fillRef idx="0">
+            <a:schemeClr val="accent1"/>
+          </a:fillRef>
+          <a:effectRef idx="0">
+            <a:schemeClr val="accent1"/>
+          </a:effectRef>
+          <a:fontRef idx="minor">
+            <a:schemeClr val="tx1"/>
+          </a:fontRef>
+        </p:style>
+      </p:cxnSp>
+      <p:sp>
+        <p:nvSpPr>
+          <p:cNvPr id="16" name="Rectangle 15"/>
+          <p:cNvSpPr/>
+          <p:nvPr/>
+        </p:nvSpPr>
+        <p:spPr>
+          <a:xfrm>
+            <a:off x="5479491" y="3325942"/>
+            <a:ext cx="1393031" cy="364331"/>
+          </a:xfrm>
+          <a:prstGeom prst="rect">
+            <a:avLst/>
+          </a:prstGeom>
+        </p:spPr>
+        <p:style>
+          <a:lnRef idx="2">
+            <a:schemeClr val="accent1">
+              <a:shade val="50000"/>
+            </a:schemeClr>
+          </a:lnRef>
+          <a:fillRef idx="1">
+            <a:schemeClr val="accent1"/>
+          </a:fillRef>
+          <a:effectRef idx="0">
+            <a:schemeClr val="accent1"/>
+          </a:effectRef>
+          <a:fontRef idx="minor">
+            <a:schemeClr val="lt1"/>
+          </a:fontRef>
+        </p:style>
+        <p:txBody>
+          <a:bodyPr rtlCol="0" anchor="ctr"/>
+          <a:lstStyle/>
+          <a:p>
+            <a:pPr algn="ctr"/>
+            <a:r>
+              <a:rPr lang="en-US" sz="1400" smtClean="0"/>
+              <a:t>Event</a:t>
+            </a:r>
+            <a:endParaRPr lang="en-US" sz="1400"/>
+          </a:p>
+        </p:txBody>
+      </p:sp>
+      <p:sp>
+        <p:nvSpPr>
+          <p:cNvPr id="17" name="Rectangle 16"/>
+          <p:cNvSpPr/>
+          <p:nvPr/>
+        </p:nvSpPr>
+        <p:spPr>
+          <a:xfrm>
+            <a:off x="2438398" y="3851670"/>
+            <a:ext cx="1393031" cy="364331"/>
+          </a:xfrm>
+          <a:prstGeom prst="rect">
+            <a:avLst/>
+          </a:prstGeom>
+        </p:spPr>
+        <p:style>
+          <a:lnRef idx="2">
+            <a:schemeClr val="accent1">
+              <a:shade val="50000"/>
+            </a:schemeClr>
+          </a:lnRef>
+          <a:fillRef idx="1">
+            <a:schemeClr val="accent1"/>
+          </a:fillRef>
+          <a:effectRef idx="0">
+            <a:schemeClr val="accent1"/>
+          </a:effectRef>
+          <a:fontRef idx="minor">
+            <a:schemeClr val="lt1"/>
+          </a:fontRef>
+        </p:style>
+        <p:txBody>
+          <a:bodyPr rtlCol="0" anchor="ctr"/>
+          <a:lstStyle/>
+          <a:p>
+            <a:pPr algn="ctr"/>
+            <a:r>
+              <a:rPr lang="en-US" sz="1400" smtClean="0"/>
+              <a:t>Event Processor</a:t>
+            </a:r>
+            <a:endParaRPr lang="en-US" sz="1400"/>
+          </a:p>
+        </p:txBody>
+      </p:sp>
+      <p:sp>
+        <p:nvSpPr>
+          <p:cNvPr id="18" name="Can 17"/>
+          <p:cNvSpPr/>
+          <p:nvPr/>
+        </p:nvSpPr>
+        <p:spPr>
+          <a:xfrm>
+            <a:off x="5847393" y="4898577"/>
+            <a:ext cx="657225" cy="614361"/>
+          </a:xfrm>
+          <a:prstGeom prst="can">
+            <a:avLst/>
+          </a:prstGeom>
+        </p:spPr>
+        <p:style>
+          <a:lnRef idx="2">
+            <a:schemeClr val="accent1">
+              <a:shade val="50000"/>
+            </a:schemeClr>
+          </a:lnRef>
+          <a:fillRef idx="1">
+            <a:schemeClr val="accent1"/>
+          </a:fillRef>
+          <a:effectRef idx="0">
+            <a:schemeClr val="accent1"/>
+          </a:effectRef>
+          <a:fontRef idx="minor">
+            <a:schemeClr val="lt1"/>
+          </a:fontRef>
+        </p:style>
+        <p:txBody>
+          <a:bodyPr rtlCol="0" anchor="ctr"/>
+          <a:lstStyle/>
+          <a:p>
+            <a:pPr algn="ctr"/>
+            <a:r>
+              <a:rPr lang="en-US" sz="1400" smtClean="0"/>
+              <a:t>Event Store</a:t>
+            </a:r>
+            <a:endParaRPr lang="en-US" sz="1400"/>
+          </a:p>
+        </p:txBody>
+      </p:sp>
+      <p:sp>
+        <p:nvSpPr>
+          <p:cNvPr id="21" name="Rectangle 20"/>
+          <p:cNvSpPr/>
+          <p:nvPr/>
+        </p:nvSpPr>
+        <p:spPr>
+          <a:xfrm>
+            <a:off x="5479491" y="3850831"/>
+            <a:ext cx="1393031" cy="364331"/>
+          </a:xfrm>
+          <a:prstGeom prst="rect">
+            <a:avLst/>
+          </a:prstGeom>
+        </p:spPr>
+        <p:style>
+          <a:lnRef idx="2">
+            <a:schemeClr val="accent1">
+              <a:shade val="50000"/>
+            </a:schemeClr>
+          </a:lnRef>
+          <a:fillRef idx="1">
+            <a:schemeClr val="accent1"/>
+          </a:fillRef>
+          <a:effectRef idx="0">
+            <a:schemeClr val="accent1"/>
+          </a:effectRef>
+          <a:fontRef idx="minor">
+            <a:schemeClr val="lt1"/>
+          </a:fontRef>
+        </p:style>
+        <p:txBody>
+          <a:bodyPr rtlCol="0" anchor="ctr"/>
+          <a:lstStyle/>
+          <a:p>
+            <a:pPr algn="ctr"/>
+            <a:r>
+              <a:rPr lang="en-US" sz="1400" dirty="0" smtClean="0"/>
+              <a:t>Event Coordinator</a:t>
+            </a:r>
+            <a:endParaRPr lang="en-US" sz="1400" dirty="0"/>
+          </a:p>
+        </p:txBody>
+      </p:sp>
+      <p:sp>
+        <p:nvSpPr>
+          <p:cNvPr id="24" name="Rectangle 23"/>
+          <p:cNvSpPr/>
+          <p:nvPr/>
+        </p:nvSpPr>
+        <p:spPr>
+          <a:xfrm>
+            <a:off x="5479491" y="4374704"/>
+            <a:ext cx="1393031" cy="364331"/>
+          </a:xfrm>
+          <a:prstGeom prst="rect">
+            <a:avLst/>
+          </a:prstGeom>
+        </p:spPr>
+        <p:style>
+          <a:lnRef idx="2">
+            <a:schemeClr val="accent1">
+              <a:shade val="50000"/>
+            </a:schemeClr>
+          </a:lnRef>
+          <a:fillRef idx="1">
+            <a:schemeClr val="accent1"/>
+          </a:fillRef>
+          <a:effectRef idx="0">
+            <a:schemeClr val="accent1"/>
+          </a:effectRef>
+          <a:fontRef idx="minor">
+            <a:schemeClr val="lt1"/>
+          </a:fontRef>
+        </p:style>
+        <p:txBody>
+          <a:bodyPr rtlCol="0" anchor="ctr"/>
+          <a:lstStyle/>
+          <a:p>
+            <a:pPr algn="ctr"/>
+            <a:r>
+              <a:rPr lang="en-US" sz="1400" dirty="0" smtClean="0"/>
+              <a:t>Event Bus</a:t>
+            </a:r>
+            <a:endParaRPr lang="en-US" sz="1400" dirty="0"/>
+          </a:p>
+        </p:txBody>
+      </p:sp>
+      <p:sp>
+        <p:nvSpPr>
+          <p:cNvPr id="25" name="Can 24"/>
+          <p:cNvSpPr/>
+          <p:nvPr/>
+        </p:nvSpPr>
+        <p:spPr>
+          <a:xfrm>
+            <a:off x="3636168" y="4898577"/>
+            <a:ext cx="657225" cy="614361"/>
+          </a:xfrm>
+          <a:prstGeom prst="can">
+            <a:avLst/>
+          </a:prstGeom>
+        </p:spPr>
+        <p:style>
+          <a:lnRef idx="2">
+            <a:schemeClr val="accent1">
+              <a:shade val="50000"/>
+            </a:schemeClr>
+          </a:lnRef>
+          <a:fillRef idx="1">
+            <a:schemeClr val="accent1"/>
+          </a:fillRef>
+          <a:effectRef idx="0">
+            <a:schemeClr val="accent1"/>
+          </a:effectRef>
+          <a:fontRef idx="minor">
+            <a:schemeClr val="lt1"/>
+          </a:fontRef>
+        </p:style>
+        <p:txBody>
+          <a:bodyPr rtlCol="0" anchor="ctr"/>
+          <a:lstStyle/>
+          <a:p>
+            <a:pPr algn="ctr"/>
+            <a:r>
+              <a:rPr lang="en-US" sz="1400" dirty="0" smtClean="0"/>
+              <a:t>Data</a:t>
+            </a:r>
+            <a:endParaRPr lang="en-US" sz="1400" dirty="0"/>
+          </a:p>
+        </p:txBody>
+      </p:sp>
+      <p:sp>
+        <p:nvSpPr>
+          <p:cNvPr id="26" name="Rectangle 25"/>
+          <p:cNvSpPr/>
+          <p:nvPr/>
+        </p:nvSpPr>
+        <p:spPr>
+          <a:xfrm>
+            <a:off x="4015743" y="2845871"/>
+            <a:ext cx="1393031" cy="364331"/>
+          </a:xfrm>
+          <a:prstGeom prst="rect">
+            <a:avLst/>
+          </a:prstGeom>
+        </p:spPr>
+        <p:style>
+          <a:lnRef idx="2">
+            <a:schemeClr val="accent1">
+              <a:shade val="50000"/>
+            </a:schemeClr>
+          </a:lnRef>
+          <a:fillRef idx="1">
+            <a:schemeClr val="accent1"/>
+          </a:fillRef>
+          <a:effectRef idx="0">
+            <a:schemeClr val="accent1"/>
+          </a:effectRef>
+          <a:fontRef idx="minor">
+            <a:schemeClr val="lt1"/>
+          </a:fontRef>
+        </p:style>
+        <p:txBody>
+          <a:bodyPr rtlCol="0" anchor="ctr"/>
+          <a:lstStyle/>
+          <a:p>
+            <a:pPr algn="ctr"/>
+            <a:r>
+              <a:rPr lang="en-US" sz="1400" dirty="0" smtClean="0"/>
+              <a:t>Query</a:t>
+            </a:r>
+          </a:p>
+          <a:p>
+            <a:pPr algn="ctr"/>
+            <a:r>
+              <a:rPr lang="en-US" sz="1400" dirty="0" smtClean="0"/>
+              <a:t>Controller</a:t>
+            </a:r>
+            <a:endParaRPr lang="en-US" sz="1400" dirty="0"/>
+          </a:p>
+        </p:txBody>
+      </p:sp>
+      <p:cxnSp>
+        <p:nvCxnSpPr>
+          <p:cNvPr id="28" name="Elbow Connector 27"/>
+          <p:cNvCxnSpPr>
+            <a:stCxn id="26" idx="2"/>
+            <a:endCxn id="25" idx="1"/>
+          </p:cNvCxnSpPr>
+          <p:nvPr/>
+        </p:nvCxnSpPr>
+        <p:spPr>
+          <a:xfrm rot="5400000">
+            <a:off x="3494333" y="3680650"/>
+            <a:ext cx="1688375" cy="747478"/>
+          </a:xfrm>
+          <a:prstGeom prst="bentConnector3">
+            <a:avLst>
+              <a:gd name="adj1" fmla="val 80041"/>
+            </a:avLst>
+          </a:prstGeom>
+          <a:ln>
+            <a:tailEnd type="triangle"/>
+          </a:ln>
+        </p:spPr>
+        <p:style>
+          <a:lnRef idx="1">
+            <a:schemeClr val="accent1"/>
+          </a:lnRef>
+          <a:fillRef idx="0">
+            <a:schemeClr val="accent1"/>
+          </a:fillRef>
+          <a:effectRef idx="0">
+            <a:schemeClr val="accent1"/>
+          </a:effectRef>
+          <a:fontRef idx="minor">
+            <a:schemeClr val="tx1"/>
+          </a:fontRef>
+        </p:style>
+      </p:cxnSp>
+      <p:cxnSp>
+        <p:nvCxnSpPr>
+          <p:cNvPr id="30" name="Elbow Connector 29"/>
+          <p:cNvCxnSpPr>
+            <a:stCxn id="17" idx="2"/>
+            <a:endCxn id="25" idx="1"/>
+          </p:cNvCxnSpPr>
+          <p:nvPr/>
+        </p:nvCxnSpPr>
+        <p:spPr>
+          <a:xfrm rot="16200000" flipH="1">
+            <a:off x="3208559" y="4142355"/>
+            <a:ext cx="682576" cy="829867"/>
+          </a:xfrm>
+          <a:prstGeom prst="bentConnector3">
+            <a:avLst>
+              <a:gd name="adj1" fmla="val 50000"/>
+            </a:avLst>
+          </a:prstGeom>
+          <a:ln>
+            <a:tailEnd type="triangle"/>
+          </a:ln>
+        </p:spPr>
+        <p:style>
+          <a:lnRef idx="1">
+            <a:schemeClr val="accent1"/>
+          </a:lnRef>
+          <a:fillRef idx="0">
+            <a:schemeClr val="accent1"/>
+          </a:fillRef>
+          <a:effectRef idx="0">
+            <a:schemeClr val="accent1"/>
+          </a:effectRef>
+          <a:fontRef idx="minor">
+            <a:schemeClr val="tx1"/>
+          </a:fontRef>
+        </p:style>
+      </p:cxnSp>
+      <p:cxnSp>
+        <p:nvCxnSpPr>
+          <p:cNvPr id="33" name="Elbow Connector 32"/>
+          <p:cNvCxnSpPr>
+            <a:stCxn id="21" idx="1"/>
+            <a:endCxn id="17" idx="3"/>
+          </p:cNvCxnSpPr>
+          <p:nvPr/>
+        </p:nvCxnSpPr>
+        <p:spPr>
+          <a:xfrm rot="10800000" flipV="1">
+            <a:off x="3831429" y="4032996"/>
+            <a:ext cx="1648062" cy="839"/>
+          </a:xfrm>
+          <a:prstGeom prst="bentConnector3">
+            <a:avLst/>
+          </a:prstGeom>
+          <a:ln>
+            <a:tailEnd type="triangle"/>
+          </a:ln>
+        </p:spPr>
+        <p:style>
+          <a:lnRef idx="1">
+            <a:schemeClr val="accent1"/>
+          </a:lnRef>
+          <a:fillRef idx="0">
+            <a:schemeClr val="accent1"/>
+          </a:fillRef>
+          <a:effectRef idx="0">
+            <a:schemeClr val="accent1"/>
+          </a:effectRef>
+          <a:fontRef idx="minor">
+            <a:schemeClr val="tx1"/>
+          </a:fontRef>
+        </p:style>
+      </p:cxnSp>
+      <p:cxnSp>
+        <p:nvCxnSpPr>
+          <p:cNvPr id="37" name="Straight Arrow Connector 36"/>
+          <p:cNvCxnSpPr>
+            <a:stCxn id="9" idx="2"/>
+            <a:endCxn id="16" idx="0"/>
+          </p:cNvCxnSpPr>
+          <p:nvPr/>
+        </p:nvCxnSpPr>
+        <p:spPr>
+          <a:xfrm>
+            <a:off x="6176007" y="3206878"/>
+            <a:ext cx="0" cy="119064"/>
+          </a:xfrm>
+          <a:prstGeom prst="straightConnector1">
+            <a:avLst/>
+          </a:prstGeom>
+          <a:ln>
+            <a:tailEnd type="triangle"/>
+          </a:ln>
+        </p:spPr>
+        <p:style>
+          <a:lnRef idx="1">
+            <a:schemeClr val="accent1"/>
+          </a:lnRef>
+          <a:fillRef idx="0">
+            <a:schemeClr val="accent1"/>
+          </a:fillRef>
+          <a:effectRef idx="0">
+            <a:schemeClr val="accent1"/>
+          </a:effectRef>
+          <a:fontRef idx="minor">
+            <a:schemeClr val="tx1"/>
+          </a:fontRef>
+        </p:style>
+      </p:cxnSp>
+      <p:cxnSp>
+        <p:nvCxnSpPr>
+          <p:cNvPr id="39" name="Straight Arrow Connector 38"/>
+          <p:cNvCxnSpPr>
+            <a:stCxn id="16" idx="2"/>
+            <a:endCxn id="21" idx="0"/>
+          </p:cNvCxnSpPr>
+          <p:nvPr/>
+        </p:nvCxnSpPr>
+        <p:spPr>
+          <a:xfrm>
+            <a:off x="6176007" y="3690273"/>
+            <a:ext cx="0" cy="160558"/>
+          </a:xfrm>
+          <a:prstGeom prst="straightConnector1">
+            <a:avLst/>
+          </a:prstGeom>
+          <a:ln>
+            <a:tailEnd type="triangle"/>
+          </a:ln>
+        </p:spPr>
+        <p:style>
+          <a:lnRef idx="1">
+            <a:schemeClr val="accent1"/>
+          </a:lnRef>
+          <a:fillRef idx="0">
+            <a:schemeClr val="accent1"/>
+          </a:fillRef>
+          <a:effectRef idx="0">
+            <a:schemeClr val="accent1"/>
+          </a:effectRef>
+          <a:fontRef idx="minor">
+            <a:schemeClr val="tx1"/>
+          </a:fontRef>
+        </p:style>
+      </p:cxnSp>
+      <p:cxnSp>
+        <p:nvCxnSpPr>
+          <p:cNvPr id="41" name="Straight Arrow Connector 40"/>
+          <p:cNvCxnSpPr>
+            <a:stCxn id="21" idx="2"/>
+            <a:endCxn id="24" idx="0"/>
+          </p:cNvCxnSpPr>
+          <p:nvPr/>
+        </p:nvCxnSpPr>
+        <p:spPr>
+          <a:xfrm>
+            <a:off x="6176007" y="4215162"/>
+            <a:ext cx="0" cy="159542"/>
+          </a:xfrm>
+          <a:prstGeom prst="straightConnector1">
+            <a:avLst/>
+          </a:prstGeom>
+          <a:ln>
+            <a:tailEnd type="triangle"/>
+          </a:ln>
+        </p:spPr>
+        <p:style>
+          <a:lnRef idx="1">
+            <a:schemeClr val="accent1"/>
+          </a:lnRef>
+          <a:fillRef idx="0">
+            <a:schemeClr val="accent1"/>
+          </a:fillRef>
+          <a:effectRef idx="0">
+            <a:schemeClr val="accent1"/>
+          </a:effectRef>
+          <a:fontRef idx="minor">
+            <a:schemeClr val="tx1"/>
+          </a:fontRef>
+        </p:style>
+      </p:cxnSp>
+      <p:cxnSp>
+        <p:nvCxnSpPr>
+          <p:cNvPr id="43" name="Straight Arrow Connector 42"/>
+          <p:cNvCxnSpPr>
+            <a:stCxn id="24" idx="2"/>
+            <a:endCxn id="18" idx="1"/>
+          </p:cNvCxnSpPr>
+          <p:nvPr/>
+        </p:nvCxnSpPr>
+        <p:spPr>
+          <a:xfrm flipH="1">
+            <a:off x="6176006" y="4739035"/>
+            <a:ext cx="1" cy="159542"/>
+          </a:xfrm>
+          <a:prstGeom prst="straightConnector1">
+            <a:avLst/>
+          </a:prstGeom>
+          <a:ln>
+            <a:tailEnd type="triangle"/>
+          </a:ln>
+        </p:spPr>
+        <p:style>
+          <a:lnRef idx="1">
+            <a:schemeClr val="accent1"/>
+          </a:lnRef>
+          <a:fillRef idx="0">
+            <a:schemeClr val="accent1"/>
+          </a:fillRef>
+          <a:effectRef idx="0">
+            <a:schemeClr val="accent1"/>
+          </a:effectRef>
+          <a:fontRef idx="minor">
+            <a:schemeClr val="tx1"/>
+          </a:fontRef>
+        </p:style>
+      </p:cxnSp>
+      <p:sp>
+        <p:nvSpPr>
+          <p:cNvPr id="50" name="Rectangle 49"/>
+          <p:cNvSpPr/>
+          <p:nvPr/>
+        </p:nvSpPr>
+        <p:spPr>
+          <a:xfrm>
+            <a:off x="3949484" y="1712294"/>
+            <a:ext cx="1393031" cy="364331"/>
+          </a:xfrm>
+          <a:prstGeom prst="rect">
+            <a:avLst/>
+          </a:prstGeom>
+        </p:spPr>
+        <p:style>
+          <a:lnRef idx="2">
+            <a:schemeClr val="accent1">
+              <a:shade val="50000"/>
+            </a:schemeClr>
+          </a:lnRef>
+          <a:fillRef idx="1">
+            <a:schemeClr val="accent1"/>
+          </a:fillRef>
+          <a:effectRef idx="0">
+            <a:schemeClr val="accent1"/>
+          </a:effectRef>
+          <a:fontRef idx="minor">
+            <a:schemeClr val="lt1"/>
+          </a:fontRef>
+        </p:style>
+        <p:txBody>
+          <a:bodyPr rtlCol="0" anchor="ctr"/>
+          <a:lstStyle/>
+          <a:p>
+            <a:pPr algn="ctr"/>
+            <a:r>
+              <a:rPr lang="en-US" sz="1400" dirty="0" smtClean="0"/>
+              <a:t>View</a:t>
+            </a:r>
+          </a:p>
+          <a:p>
+            <a:pPr algn="ctr"/>
+            <a:r>
+              <a:rPr lang="en-US" sz="1000" dirty="0" smtClean="0"/>
+              <a:t>(HTML)</a:t>
+            </a:r>
+            <a:endParaRPr lang="en-US" sz="1000" dirty="0"/>
+          </a:p>
+        </p:txBody>
+      </p:sp>
+      <p:sp>
+        <p:nvSpPr>
+          <p:cNvPr id="51" name="Rectangle 50"/>
+          <p:cNvSpPr/>
+          <p:nvPr/>
+        </p:nvSpPr>
+        <p:spPr>
+          <a:xfrm>
+            <a:off x="5479489" y="1712294"/>
+            <a:ext cx="1393031" cy="364331"/>
+          </a:xfrm>
+          <a:prstGeom prst="rect">
+            <a:avLst/>
+          </a:prstGeom>
+        </p:spPr>
+        <p:style>
+          <a:lnRef idx="2">
+            <a:schemeClr val="accent1">
+              <a:shade val="50000"/>
+            </a:schemeClr>
+          </a:lnRef>
+          <a:fillRef idx="1">
+            <a:schemeClr val="accent1"/>
+          </a:fillRef>
+          <a:effectRef idx="0">
+            <a:schemeClr val="accent1"/>
+          </a:effectRef>
+          <a:fontRef idx="minor">
+            <a:schemeClr val="lt1"/>
+          </a:fontRef>
+        </p:style>
+        <p:txBody>
+          <a:bodyPr rtlCol="0" anchor="ctr"/>
+          <a:lstStyle/>
+          <a:p>
+            <a:pPr algn="ctr"/>
+            <a:r>
+              <a:rPr lang="en-US" sz="1400" dirty="0" smtClean="0"/>
+              <a:t>Controller</a:t>
+            </a:r>
+          </a:p>
+          <a:p>
+            <a:pPr algn="ctr"/>
+            <a:r>
+              <a:rPr lang="en-US" sz="1000" dirty="0" smtClean="0"/>
+              <a:t>(JavaScript)</a:t>
+            </a:r>
+            <a:endParaRPr lang="en-US" sz="1000" dirty="0"/>
+          </a:p>
+        </p:txBody>
+      </p:sp>
+      <p:sp>
+        <p:nvSpPr>
+          <p:cNvPr id="52" name="Rectangle 51"/>
+          <p:cNvSpPr/>
+          <p:nvPr/>
+        </p:nvSpPr>
+        <p:spPr>
+          <a:xfrm>
+            <a:off x="2438397" y="1722235"/>
+            <a:ext cx="1393031" cy="364331"/>
+          </a:xfrm>
+          <a:prstGeom prst="rect">
+            <a:avLst/>
+          </a:prstGeom>
+        </p:spPr>
+        <p:style>
+          <a:lnRef idx="2">
+            <a:schemeClr val="accent1">
+              <a:shade val="50000"/>
+            </a:schemeClr>
+          </a:lnRef>
+          <a:fillRef idx="1">
+            <a:schemeClr val="accent1"/>
+          </a:fillRef>
+          <a:effectRef idx="0">
+            <a:schemeClr val="accent1"/>
+          </a:effectRef>
+          <a:fontRef idx="minor">
+            <a:schemeClr val="lt1"/>
+          </a:fontRef>
+        </p:style>
+        <p:txBody>
+          <a:bodyPr rtlCol="0" anchor="ctr"/>
+          <a:lstStyle/>
+          <a:p>
+            <a:pPr algn="ctr"/>
+            <a:r>
+              <a:rPr lang="en-US" sz="1400" dirty="0" smtClean="0"/>
+              <a:t>Styling </a:t>
+            </a:r>
+          </a:p>
+          <a:p>
+            <a:pPr algn="ctr"/>
+            <a:r>
+              <a:rPr lang="en-US" sz="1000" dirty="0" smtClean="0"/>
+              <a:t>(CSS)</a:t>
+            </a:r>
+            <a:endParaRPr lang="en-US" sz="1000" dirty="0"/>
+          </a:p>
+        </p:txBody>
+      </p:sp>
+      <p:cxnSp>
+        <p:nvCxnSpPr>
+          <p:cNvPr id="54" name="Elbow Connector 53"/>
+          <p:cNvCxnSpPr>
+            <a:stCxn id="51" idx="2"/>
+            <a:endCxn id="9" idx="0"/>
+          </p:cNvCxnSpPr>
+          <p:nvPr/>
+        </p:nvCxnSpPr>
+        <p:spPr>
+          <a:xfrm rot="16200000" flipH="1">
+            <a:off x="5793045" y="2459585"/>
+            <a:ext cx="765922" cy="2"/>
+          </a:xfrm>
+          <a:prstGeom prst="bentConnector3">
+            <a:avLst/>
+          </a:prstGeom>
+          <a:ln>
+            <a:tailEnd type="triangle"/>
+          </a:ln>
+        </p:spPr>
+        <p:style>
+          <a:lnRef idx="1">
+            <a:schemeClr val="accent1"/>
+          </a:lnRef>
+          <a:fillRef idx="0">
+            <a:schemeClr val="accent1"/>
+          </a:fillRef>
+          <a:effectRef idx="0">
+            <a:schemeClr val="accent1"/>
+          </a:effectRef>
+          <a:fontRef idx="minor">
+            <a:schemeClr val="tx1"/>
+          </a:fontRef>
+        </p:style>
+      </p:cxnSp>
+      <p:cxnSp>
+        <p:nvCxnSpPr>
+          <p:cNvPr id="56" name="Elbow Connector 55"/>
+          <p:cNvCxnSpPr>
+            <a:stCxn id="51" idx="2"/>
+            <a:endCxn id="26" idx="0"/>
+          </p:cNvCxnSpPr>
+          <p:nvPr/>
+        </p:nvCxnSpPr>
+        <p:spPr>
+          <a:xfrm rot="5400000">
+            <a:off x="5059509" y="1729375"/>
+            <a:ext cx="769246" cy="1463746"/>
+          </a:xfrm>
+          <a:prstGeom prst="bentConnector3">
+            <a:avLst/>
+          </a:prstGeom>
+          <a:ln>
+            <a:tailEnd type="triangle"/>
+          </a:ln>
+        </p:spPr>
+        <p:style>
+          <a:lnRef idx="1">
+            <a:schemeClr val="accent1"/>
+          </a:lnRef>
+          <a:fillRef idx="0">
+            <a:schemeClr val="accent1"/>
+          </a:fillRef>
+          <a:effectRef idx="0">
+            <a:schemeClr val="accent1"/>
+          </a:effectRef>
+          <a:fontRef idx="minor">
+            <a:schemeClr val="tx1"/>
+          </a:fontRef>
+        </p:style>
+      </p:cxnSp>
+    </p:spTree>
+    <p:extLst>
+      <p:ext uri="{BB962C8B-B14F-4D97-AF65-F5344CB8AC3E}">
+        <p14:creationId xmlns:p14="http://schemas.microsoft.com/office/powerpoint/2010/main" val="868569423"/>
+      </p:ext>
+    </p:extLst>
+  </p:cSld>
+  <p:clrMapOvr>
+    <a:masterClrMapping/>
+  </p:clrMapOvr>
+</p:sld>
+</file>
+
 <file path=ppt/theme/theme1.xml><?xml version="1.0" encoding="utf-8"?>
 <a:theme xmlns:a="http://schemas.openxmlformats.org/drawingml/2006/main" name="Office Theme">
   <a:themeElements>

</xml_diff>

<commit_message>
Adding a top level description and figure.
</commit_message>
<xml_diff>
--- a/Documentation/Architecture/Diagrams.pptx
+++ b/Documentation/Architecture/Diagrams.pptx
@@ -7,6 +7,7 @@
   <p:sldIdLst>
     <p:sldId id="256" r:id="rId2"/>
     <p:sldId id="257" r:id="rId3"/>
+    <p:sldId id="258" r:id="rId4"/>
   </p:sldIdLst>
   <p:sldSz cx="12192000" cy="6858000"/>
   <p:notesSz cx="6858000" cy="9144000"/>
@@ -3869,7 +3870,7 @@
             <a:pPr algn="ctr"/>
             <a:r>
               <a:rPr lang="en-US" sz="1400" dirty="0" smtClean="0"/>
-              <a:t>Event Bus</a:t>
+              <a:t>Messaging infra.</a:t>
             </a:r>
             <a:endParaRPr lang="en-US" sz="1400" dirty="0"/>
           </a:p>
@@ -4455,6 +4456,820 @@
     <p:extLst>
       <p:ext uri="{BB962C8B-B14F-4D97-AF65-F5344CB8AC3E}">
         <p14:creationId xmlns:p14="http://schemas.microsoft.com/office/powerpoint/2010/main" val="868569423"/>
+      </p:ext>
+    </p:extLst>
+  </p:cSld>
+  <p:clrMapOvr>
+    <a:masterClrMapping/>
+  </p:clrMapOvr>
+</p:sld>
+</file>
+
+<file path=ppt/slides/slide3.xml><?xml version="1.0" encoding="utf-8"?>
+<p:sld xmlns:a="http://schemas.openxmlformats.org/drawingml/2006/main" xmlns:r="http://schemas.openxmlformats.org/officeDocument/2006/relationships" xmlns:p="http://schemas.openxmlformats.org/presentationml/2006/main">
+  <p:cSld>
+    <p:spTree>
+      <p:nvGrpSpPr>
+        <p:cNvPr id="1" name=""/>
+        <p:cNvGrpSpPr/>
+        <p:nvPr/>
+      </p:nvGrpSpPr>
+      <p:grpSpPr>
+        <a:xfrm>
+          <a:off x="0" y="0"/>
+          <a:ext cx="0" cy="0"/>
+          <a:chOff x="0" y="0"/>
+          <a:chExt cx="0" cy="0"/>
+        </a:xfrm>
+      </p:grpSpPr>
+      <p:sp>
+        <p:nvSpPr>
+          <p:cNvPr id="4" name="Rounded Rectangle 3"/>
+          <p:cNvSpPr/>
+          <p:nvPr/>
+        </p:nvSpPr>
+        <p:spPr>
+          <a:xfrm>
+            <a:off x="707232" y="1054722"/>
+            <a:ext cx="2343150" cy="2302841"/>
+          </a:xfrm>
+          <a:prstGeom prst="roundRect">
+            <a:avLst/>
+          </a:prstGeom>
+          <a:noFill/>
+          <a:ln>
+            <a:prstDash val="dash"/>
+          </a:ln>
+        </p:spPr>
+        <p:style>
+          <a:lnRef idx="2">
+            <a:schemeClr val="accent1">
+              <a:shade val="50000"/>
+            </a:schemeClr>
+          </a:lnRef>
+          <a:fillRef idx="1">
+            <a:schemeClr val="accent1"/>
+          </a:fillRef>
+          <a:effectRef idx="0">
+            <a:schemeClr val="accent1"/>
+          </a:effectRef>
+          <a:fontRef idx="minor">
+            <a:schemeClr val="lt1"/>
+          </a:fontRef>
+        </p:style>
+        <p:txBody>
+          <a:bodyPr rtlCol="0" anchor="t" anchorCtr="0"/>
+          <a:lstStyle/>
+          <a:p>
+            <a:r>
+              <a:rPr lang="en-US" smtClean="0">
+                <a:solidFill>
+                  <a:schemeClr val="tx1"/>
+                </a:solidFill>
+              </a:rPr>
+              <a:t>Bounded Context A</a:t>
+            </a:r>
+            <a:endParaRPr lang="en-US" dirty="0">
+              <a:solidFill>
+                <a:schemeClr val="tx1"/>
+              </a:solidFill>
+            </a:endParaRPr>
+          </a:p>
+        </p:txBody>
+      </p:sp>
+      <p:sp>
+        <p:nvSpPr>
+          <p:cNvPr id="5" name="Rectangle 4"/>
+          <p:cNvSpPr/>
+          <p:nvPr/>
+        </p:nvSpPr>
+        <p:spPr>
+          <a:xfrm>
+            <a:off x="907491" y="1535241"/>
+            <a:ext cx="1978584" cy="364331"/>
+          </a:xfrm>
+          <a:prstGeom prst="rect">
+            <a:avLst/>
+          </a:prstGeom>
+        </p:spPr>
+        <p:style>
+          <a:lnRef idx="2">
+            <a:schemeClr val="accent1">
+              <a:shade val="50000"/>
+            </a:schemeClr>
+          </a:lnRef>
+          <a:fillRef idx="1">
+            <a:schemeClr val="accent1"/>
+          </a:fillRef>
+          <a:effectRef idx="0">
+            <a:schemeClr val="accent1"/>
+          </a:effectRef>
+          <a:fontRef idx="minor">
+            <a:schemeClr val="lt1"/>
+          </a:fontRef>
+        </p:style>
+        <p:txBody>
+          <a:bodyPr rtlCol="0" anchor="ctr"/>
+          <a:lstStyle/>
+          <a:p>
+            <a:pPr algn="ctr"/>
+            <a:r>
+              <a:rPr lang="en-US" sz="1400" smtClean="0"/>
+              <a:t>Frontend</a:t>
+            </a:r>
+            <a:endParaRPr lang="en-US" sz="1400" dirty="0"/>
+          </a:p>
+        </p:txBody>
+      </p:sp>
+      <p:sp>
+        <p:nvSpPr>
+          <p:cNvPr id="6" name="Rectangle 5"/>
+          <p:cNvSpPr/>
+          <p:nvPr/>
+        </p:nvSpPr>
+        <p:spPr>
+          <a:xfrm>
+            <a:off x="907491" y="2044132"/>
+            <a:ext cx="1978584" cy="364331"/>
+          </a:xfrm>
+          <a:prstGeom prst="rect">
+            <a:avLst/>
+          </a:prstGeom>
+        </p:spPr>
+        <p:style>
+          <a:lnRef idx="2">
+            <a:schemeClr val="accent1">
+              <a:shade val="50000"/>
+            </a:schemeClr>
+          </a:lnRef>
+          <a:fillRef idx="1">
+            <a:schemeClr val="accent1"/>
+          </a:fillRef>
+          <a:effectRef idx="0">
+            <a:schemeClr val="accent1"/>
+          </a:effectRef>
+          <a:fontRef idx="minor">
+            <a:schemeClr val="lt1"/>
+          </a:fontRef>
+        </p:style>
+        <p:txBody>
+          <a:bodyPr rtlCol="0" anchor="ctr"/>
+          <a:lstStyle/>
+          <a:p>
+            <a:pPr algn="ctr"/>
+            <a:r>
+              <a:rPr lang="en-US" sz="1400" dirty="0" smtClean="0"/>
+              <a:t>Backend</a:t>
+            </a:r>
+            <a:endParaRPr lang="en-US" sz="1400" dirty="0"/>
+          </a:p>
+        </p:txBody>
+      </p:sp>
+      <p:sp>
+        <p:nvSpPr>
+          <p:cNvPr id="7" name="Can 6"/>
+          <p:cNvSpPr/>
+          <p:nvPr/>
+        </p:nvSpPr>
+        <p:spPr>
+          <a:xfrm>
+            <a:off x="985838" y="2561646"/>
+            <a:ext cx="657225" cy="614361"/>
+          </a:xfrm>
+          <a:prstGeom prst="can">
+            <a:avLst/>
+          </a:prstGeom>
+        </p:spPr>
+        <p:style>
+          <a:lnRef idx="2">
+            <a:schemeClr val="accent1">
+              <a:shade val="50000"/>
+            </a:schemeClr>
+          </a:lnRef>
+          <a:fillRef idx="1">
+            <a:schemeClr val="accent1"/>
+          </a:fillRef>
+          <a:effectRef idx="0">
+            <a:schemeClr val="accent1"/>
+          </a:effectRef>
+          <a:fontRef idx="minor">
+            <a:schemeClr val="lt1"/>
+          </a:fontRef>
+        </p:style>
+        <p:txBody>
+          <a:bodyPr rtlCol="0" anchor="ctr"/>
+          <a:lstStyle/>
+          <a:p>
+            <a:pPr algn="ctr"/>
+            <a:r>
+              <a:rPr lang="en-US" sz="1400" dirty="0" smtClean="0"/>
+              <a:t>Data</a:t>
+            </a:r>
+            <a:endParaRPr lang="en-US" sz="1400" dirty="0"/>
+          </a:p>
+        </p:txBody>
+      </p:sp>
+      <p:sp>
+        <p:nvSpPr>
+          <p:cNvPr id="8" name="Can 7"/>
+          <p:cNvSpPr/>
+          <p:nvPr/>
+        </p:nvSpPr>
+        <p:spPr>
+          <a:xfrm rot="5400000">
+            <a:off x="2986559" y="1695429"/>
+            <a:ext cx="485775" cy="4771083"/>
+          </a:xfrm>
+          <a:prstGeom prst="can">
+            <a:avLst/>
+          </a:prstGeom>
+        </p:spPr>
+        <p:style>
+          <a:lnRef idx="2">
+            <a:schemeClr val="accent1">
+              <a:shade val="50000"/>
+            </a:schemeClr>
+          </a:lnRef>
+          <a:fillRef idx="1">
+            <a:schemeClr val="accent1"/>
+          </a:fillRef>
+          <a:effectRef idx="0">
+            <a:schemeClr val="accent1"/>
+          </a:effectRef>
+          <a:fontRef idx="minor">
+            <a:schemeClr val="lt1"/>
+          </a:fontRef>
+        </p:style>
+        <p:txBody>
+          <a:bodyPr rtlCol="0" anchor="ctr"/>
+          <a:lstStyle/>
+          <a:p>
+            <a:pPr algn="ctr"/>
+            <a:endParaRPr lang="en-US"/>
+          </a:p>
+        </p:txBody>
+      </p:sp>
+      <p:sp>
+        <p:nvSpPr>
+          <p:cNvPr id="9" name="Rectangle 8"/>
+          <p:cNvSpPr/>
+          <p:nvPr/>
+        </p:nvSpPr>
+        <p:spPr>
+          <a:xfrm>
+            <a:off x="1775458" y="2561646"/>
+            <a:ext cx="1110617" cy="364331"/>
+          </a:xfrm>
+          <a:prstGeom prst="rect">
+            <a:avLst/>
+          </a:prstGeom>
+        </p:spPr>
+        <p:style>
+          <a:lnRef idx="2">
+            <a:schemeClr val="accent1">
+              <a:shade val="50000"/>
+            </a:schemeClr>
+          </a:lnRef>
+          <a:fillRef idx="1">
+            <a:schemeClr val="accent1"/>
+          </a:fillRef>
+          <a:effectRef idx="0">
+            <a:schemeClr val="accent1"/>
+          </a:effectRef>
+          <a:fontRef idx="minor">
+            <a:schemeClr val="lt1"/>
+          </a:fontRef>
+        </p:style>
+        <p:txBody>
+          <a:bodyPr rtlCol="0" anchor="ctr"/>
+          <a:lstStyle/>
+          <a:p>
+            <a:pPr algn="ctr"/>
+            <a:r>
+              <a:rPr lang="en-US" sz="1400" smtClean="0"/>
+              <a:t>Events</a:t>
+            </a:r>
+            <a:endParaRPr lang="en-US" sz="1400" dirty="0"/>
+          </a:p>
+        </p:txBody>
+      </p:sp>
+      <p:sp>
+        <p:nvSpPr>
+          <p:cNvPr id="11" name="Can 10"/>
+          <p:cNvSpPr/>
+          <p:nvPr/>
+        </p:nvSpPr>
+        <p:spPr>
+          <a:xfrm>
+            <a:off x="1082510" y="4693445"/>
+            <a:ext cx="657225" cy="614361"/>
+          </a:xfrm>
+          <a:prstGeom prst="can">
+            <a:avLst/>
+          </a:prstGeom>
+        </p:spPr>
+        <p:style>
+          <a:lnRef idx="2">
+            <a:schemeClr val="accent1">
+              <a:shade val="50000"/>
+            </a:schemeClr>
+          </a:lnRef>
+          <a:fillRef idx="1">
+            <a:schemeClr val="accent1"/>
+          </a:fillRef>
+          <a:effectRef idx="0">
+            <a:schemeClr val="accent1"/>
+          </a:effectRef>
+          <a:fontRef idx="minor">
+            <a:schemeClr val="lt1"/>
+          </a:fontRef>
+        </p:style>
+        <p:txBody>
+          <a:bodyPr rtlCol="0" anchor="ctr"/>
+          <a:lstStyle/>
+          <a:p>
+            <a:pPr algn="ctr"/>
+            <a:r>
+              <a:rPr lang="en-US" sz="1400" smtClean="0"/>
+              <a:t>Event Store</a:t>
+            </a:r>
+            <a:endParaRPr lang="en-US" sz="1400"/>
+          </a:p>
+        </p:txBody>
+      </p:sp>
+      <p:sp>
+        <p:nvSpPr>
+          <p:cNvPr id="13" name="Down Arrow 12"/>
+          <p:cNvSpPr/>
+          <p:nvPr/>
+        </p:nvSpPr>
+        <p:spPr>
+          <a:xfrm>
+            <a:off x="2116453" y="2931132"/>
+            <a:ext cx="428625" cy="912105"/>
+          </a:xfrm>
+          <a:prstGeom prst="downArrow">
+            <a:avLst/>
+          </a:prstGeom>
+        </p:spPr>
+        <p:style>
+          <a:lnRef idx="2">
+            <a:schemeClr val="accent1">
+              <a:shade val="50000"/>
+            </a:schemeClr>
+          </a:lnRef>
+          <a:fillRef idx="1">
+            <a:schemeClr val="accent1"/>
+          </a:fillRef>
+          <a:effectRef idx="0">
+            <a:schemeClr val="accent1"/>
+          </a:effectRef>
+          <a:fontRef idx="minor">
+            <a:schemeClr val="lt1"/>
+          </a:fontRef>
+        </p:style>
+        <p:txBody>
+          <a:bodyPr rtlCol="0" anchor="ctr"/>
+          <a:lstStyle/>
+          <a:p>
+            <a:pPr algn="ctr"/>
+            <a:endParaRPr lang="en-US"/>
+          </a:p>
+        </p:txBody>
+      </p:sp>
+      <p:sp>
+        <p:nvSpPr>
+          <p:cNvPr id="14" name="Down Arrow 13"/>
+          <p:cNvSpPr/>
+          <p:nvPr/>
+        </p:nvSpPr>
+        <p:spPr>
+          <a:xfrm rot="10800000">
+            <a:off x="1196811" y="3357562"/>
+            <a:ext cx="428625" cy="485673"/>
+          </a:xfrm>
+          <a:prstGeom prst="downArrow">
+            <a:avLst/>
+          </a:prstGeom>
+        </p:spPr>
+        <p:style>
+          <a:lnRef idx="2">
+            <a:schemeClr val="accent1">
+              <a:shade val="50000"/>
+            </a:schemeClr>
+          </a:lnRef>
+          <a:fillRef idx="1">
+            <a:schemeClr val="accent1"/>
+          </a:fillRef>
+          <a:effectRef idx="0">
+            <a:schemeClr val="accent1"/>
+          </a:effectRef>
+          <a:fontRef idx="minor">
+            <a:schemeClr val="lt1"/>
+          </a:fontRef>
+        </p:style>
+        <p:txBody>
+          <a:bodyPr rtlCol="0" anchor="ctr"/>
+          <a:lstStyle/>
+          <a:p>
+            <a:pPr algn="ctr"/>
+            <a:endParaRPr lang="en-US"/>
+          </a:p>
+        </p:txBody>
+      </p:sp>
+      <p:sp>
+        <p:nvSpPr>
+          <p:cNvPr id="15" name="Rounded Rectangle 14"/>
+          <p:cNvSpPr/>
+          <p:nvPr/>
+        </p:nvSpPr>
+        <p:spPr>
+          <a:xfrm>
+            <a:off x="3182777" y="1054722"/>
+            <a:ext cx="2343150" cy="2302841"/>
+          </a:xfrm>
+          <a:prstGeom prst="roundRect">
+            <a:avLst/>
+          </a:prstGeom>
+          <a:noFill/>
+          <a:ln>
+            <a:prstDash val="dash"/>
+          </a:ln>
+        </p:spPr>
+        <p:style>
+          <a:lnRef idx="2">
+            <a:schemeClr val="accent1">
+              <a:shade val="50000"/>
+            </a:schemeClr>
+          </a:lnRef>
+          <a:fillRef idx="1">
+            <a:schemeClr val="accent1"/>
+          </a:fillRef>
+          <a:effectRef idx="0">
+            <a:schemeClr val="accent1"/>
+          </a:effectRef>
+          <a:fontRef idx="minor">
+            <a:schemeClr val="lt1"/>
+          </a:fontRef>
+        </p:style>
+        <p:txBody>
+          <a:bodyPr rtlCol="0" anchor="t" anchorCtr="0"/>
+          <a:lstStyle/>
+          <a:p>
+            <a:r>
+              <a:rPr lang="en-US" dirty="0" smtClean="0">
+                <a:solidFill>
+                  <a:schemeClr val="tx1"/>
+                </a:solidFill>
+              </a:rPr>
+              <a:t>Bounded Context B</a:t>
+            </a:r>
+            <a:endParaRPr lang="en-US" dirty="0">
+              <a:solidFill>
+                <a:schemeClr val="tx1"/>
+              </a:solidFill>
+            </a:endParaRPr>
+          </a:p>
+        </p:txBody>
+      </p:sp>
+      <p:sp>
+        <p:nvSpPr>
+          <p:cNvPr id="16" name="Rectangle 15"/>
+          <p:cNvSpPr/>
+          <p:nvPr/>
+        </p:nvSpPr>
+        <p:spPr>
+          <a:xfrm>
+            <a:off x="3383036" y="1535241"/>
+            <a:ext cx="1978584" cy="364331"/>
+          </a:xfrm>
+          <a:prstGeom prst="rect">
+            <a:avLst/>
+          </a:prstGeom>
+        </p:spPr>
+        <p:style>
+          <a:lnRef idx="2">
+            <a:schemeClr val="accent1">
+              <a:shade val="50000"/>
+            </a:schemeClr>
+          </a:lnRef>
+          <a:fillRef idx="1">
+            <a:schemeClr val="accent1"/>
+          </a:fillRef>
+          <a:effectRef idx="0">
+            <a:schemeClr val="accent1"/>
+          </a:effectRef>
+          <a:fontRef idx="minor">
+            <a:schemeClr val="lt1"/>
+          </a:fontRef>
+        </p:style>
+        <p:txBody>
+          <a:bodyPr rtlCol="0" anchor="ctr"/>
+          <a:lstStyle/>
+          <a:p>
+            <a:pPr algn="ctr"/>
+            <a:r>
+              <a:rPr lang="en-US" sz="1400" smtClean="0"/>
+              <a:t>Frontend</a:t>
+            </a:r>
+            <a:endParaRPr lang="en-US" sz="1400" dirty="0"/>
+          </a:p>
+        </p:txBody>
+      </p:sp>
+      <p:sp>
+        <p:nvSpPr>
+          <p:cNvPr id="17" name="Rectangle 16"/>
+          <p:cNvSpPr/>
+          <p:nvPr/>
+        </p:nvSpPr>
+        <p:spPr>
+          <a:xfrm>
+            <a:off x="3383036" y="2044132"/>
+            <a:ext cx="1978584" cy="364331"/>
+          </a:xfrm>
+          <a:prstGeom prst="rect">
+            <a:avLst/>
+          </a:prstGeom>
+        </p:spPr>
+        <p:style>
+          <a:lnRef idx="2">
+            <a:schemeClr val="accent1">
+              <a:shade val="50000"/>
+            </a:schemeClr>
+          </a:lnRef>
+          <a:fillRef idx="1">
+            <a:schemeClr val="accent1"/>
+          </a:fillRef>
+          <a:effectRef idx="0">
+            <a:schemeClr val="accent1"/>
+          </a:effectRef>
+          <a:fontRef idx="minor">
+            <a:schemeClr val="lt1"/>
+          </a:fontRef>
+        </p:style>
+        <p:txBody>
+          <a:bodyPr rtlCol="0" anchor="ctr"/>
+          <a:lstStyle/>
+          <a:p>
+            <a:pPr algn="ctr"/>
+            <a:r>
+              <a:rPr lang="en-US" sz="1400" dirty="0" smtClean="0"/>
+              <a:t>Backend</a:t>
+            </a:r>
+            <a:endParaRPr lang="en-US" sz="1400" dirty="0"/>
+          </a:p>
+        </p:txBody>
+      </p:sp>
+      <p:sp>
+        <p:nvSpPr>
+          <p:cNvPr id="18" name="Can 17"/>
+          <p:cNvSpPr/>
+          <p:nvPr/>
+        </p:nvSpPr>
+        <p:spPr>
+          <a:xfrm>
+            <a:off x="3461383" y="2561646"/>
+            <a:ext cx="657225" cy="614361"/>
+          </a:xfrm>
+          <a:prstGeom prst="can">
+            <a:avLst/>
+          </a:prstGeom>
+        </p:spPr>
+        <p:style>
+          <a:lnRef idx="2">
+            <a:schemeClr val="accent1">
+              <a:shade val="50000"/>
+            </a:schemeClr>
+          </a:lnRef>
+          <a:fillRef idx="1">
+            <a:schemeClr val="accent1"/>
+          </a:fillRef>
+          <a:effectRef idx="0">
+            <a:schemeClr val="accent1"/>
+          </a:effectRef>
+          <a:fontRef idx="minor">
+            <a:schemeClr val="lt1"/>
+          </a:fontRef>
+        </p:style>
+        <p:txBody>
+          <a:bodyPr rtlCol="0" anchor="ctr"/>
+          <a:lstStyle/>
+          <a:p>
+            <a:pPr algn="ctr"/>
+            <a:r>
+              <a:rPr lang="en-US" sz="1400" dirty="0" smtClean="0"/>
+              <a:t>Data</a:t>
+            </a:r>
+            <a:endParaRPr lang="en-US" sz="1400" dirty="0"/>
+          </a:p>
+        </p:txBody>
+      </p:sp>
+      <p:sp>
+        <p:nvSpPr>
+          <p:cNvPr id="19" name="Rectangle 18"/>
+          <p:cNvSpPr/>
+          <p:nvPr/>
+        </p:nvSpPr>
+        <p:spPr>
+          <a:xfrm>
+            <a:off x="4251003" y="2561646"/>
+            <a:ext cx="1110617" cy="364331"/>
+          </a:xfrm>
+          <a:prstGeom prst="rect">
+            <a:avLst/>
+          </a:prstGeom>
+        </p:spPr>
+        <p:style>
+          <a:lnRef idx="2">
+            <a:schemeClr val="accent1">
+              <a:shade val="50000"/>
+            </a:schemeClr>
+          </a:lnRef>
+          <a:fillRef idx="1">
+            <a:schemeClr val="accent1"/>
+          </a:fillRef>
+          <a:effectRef idx="0">
+            <a:schemeClr val="accent1"/>
+          </a:effectRef>
+          <a:fontRef idx="minor">
+            <a:schemeClr val="lt1"/>
+          </a:fontRef>
+        </p:style>
+        <p:txBody>
+          <a:bodyPr rtlCol="0" anchor="ctr"/>
+          <a:lstStyle/>
+          <a:p>
+            <a:pPr algn="ctr"/>
+            <a:r>
+              <a:rPr lang="en-US" sz="1400" smtClean="0"/>
+              <a:t>Events</a:t>
+            </a:r>
+            <a:endParaRPr lang="en-US" sz="1400" dirty="0"/>
+          </a:p>
+        </p:txBody>
+      </p:sp>
+      <p:sp>
+        <p:nvSpPr>
+          <p:cNvPr id="20" name="Down Arrow 19"/>
+          <p:cNvSpPr/>
+          <p:nvPr/>
+        </p:nvSpPr>
+        <p:spPr>
+          <a:xfrm>
+            <a:off x="4591998" y="2931132"/>
+            <a:ext cx="428625" cy="912105"/>
+          </a:xfrm>
+          <a:prstGeom prst="downArrow">
+            <a:avLst/>
+          </a:prstGeom>
+        </p:spPr>
+        <p:style>
+          <a:lnRef idx="2">
+            <a:schemeClr val="accent1">
+              <a:shade val="50000"/>
+            </a:schemeClr>
+          </a:lnRef>
+          <a:fillRef idx="1">
+            <a:schemeClr val="accent1"/>
+          </a:fillRef>
+          <a:effectRef idx="0">
+            <a:schemeClr val="accent1"/>
+          </a:effectRef>
+          <a:fontRef idx="minor">
+            <a:schemeClr val="lt1"/>
+          </a:fontRef>
+        </p:style>
+        <p:txBody>
+          <a:bodyPr rtlCol="0" anchor="ctr"/>
+          <a:lstStyle/>
+          <a:p>
+            <a:pPr algn="ctr"/>
+            <a:endParaRPr lang="en-US"/>
+          </a:p>
+        </p:txBody>
+      </p:sp>
+      <p:sp>
+        <p:nvSpPr>
+          <p:cNvPr id="21" name="Down Arrow 20"/>
+          <p:cNvSpPr/>
+          <p:nvPr/>
+        </p:nvSpPr>
+        <p:spPr>
+          <a:xfrm rot="10800000">
+            <a:off x="3672356" y="3357562"/>
+            <a:ext cx="428625" cy="485673"/>
+          </a:xfrm>
+          <a:prstGeom prst="downArrow">
+            <a:avLst/>
+          </a:prstGeom>
+        </p:spPr>
+        <p:style>
+          <a:lnRef idx="2">
+            <a:schemeClr val="accent1">
+              <a:shade val="50000"/>
+            </a:schemeClr>
+          </a:lnRef>
+          <a:fillRef idx="1">
+            <a:schemeClr val="accent1"/>
+          </a:fillRef>
+          <a:effectRef idx="0">
+            <a:schemeClr val="accent1"/>
+          </a:effectRef>
+          <a:fontRef idx="minor">
+            <a:schemeClr val="lt1"/>
+          </a:fontRef>
+        </p:style>
+        <p:txBody>
+          <a:bodyPr rtlCol="0" anchor="ctr"/>
+          <a:lstStyle/>
+          <a:p>
+            <a:pPr algn="ctr"/>
+            <a:endParaRPr lang="en-US"/>
+          </a:p>
+        </p:txBody>
+      </p:sp>
+      <p:sp>
+        <p:nvSpPr>
+          <p:cNvPr id="22" name="Down Arrow 21"/>
+          <p:cNvSpPr/>
+          <p:nvPr/>
+        </p:nvSpPr>
+        <p:spPr>
+          <a:xfrm>
+            <a:off x="1214438" y="4323755"/>
+            <a:ext cx="428625" cy="369690"/>
+          </a:xfrm>
+          <a:prstGeom prst="downArrow">
+            <a:avLst/>
+          </a:prstGeom>
+        </p:spPr>
+        <p:style>
+          <a:lnRef idx="2">
+            <a:schemeClr val="accent1">
+              <a:shade val="50000"/>
+            </a:schemeClr>
+          </a:lnRef>
+          <a:fillRef idx="1">
+            <a:schemeClr val="accent1"/>
+          </a:fillRef>
+          <a:effectRef idx="0">
+            <a:schemeClr val="accent1"/>
+          </a:effectRef>
+          <a:fontRef idx="minor">
+            <a:schemeClr val="lt1"/>
+          </a:fontRef>
+        </p:style>
+        <p:txBody>
+          <a:bodyPr rtlCol="0" anchor="ctr"/>
+          <a:lstStyle/>
+          <a:p>
+            <a:pPr algn="ctr"/>
+            <a:endParaRPr lang="en-US"/>
+          </a:p>
+        </p:txBody>
+      </p:sp>
+      <p:sp>
+        <p:nvSpPr>
+          <p:cNvPr id="23" name="TextBox 22"/>
+          <p:cNvSpPr txBox="1"/>
+          <p:nvPr/>
+        </p:nvSpPr>
+        <p:spPr>
+          <a:xfrm>
+            <a:off x="1878807" y="3898881"/>
+            <a:ext cx="2778919" cy="369332"/>
+          </a:xfrm>
+          <a:prstGeom prst="rect">
+            <a:avLst/>
+          </a:prstGeom>
+          <a:noFill/>
+        </p:spPr>
+        <p:txBody>
+          <a:bodyPr wrap="square" rtlCol="0">
+            <a:spAutoFit/>
+          </a:bodyPr>
+          <a:lstStyle/>
+          <a:p>
+            <a:r>
+              <a:rPr lang="en-US" smtClean="0">
+                <a:solidFill>
+                  <a:schemeClr val="bg1"/>
+                </a:solidFill>
+              </a:rPr>
+              <a:t>Messaging Infrastructure</a:t>
+            </a:r>
+            <a:endParaRPr lang="en-US">
+              <a:solidFill>
+                <a:schemeClr val="bg1"/>
+              </a:solidFill>
+            </a:endParaRPr>
+          </a:p>
+        </p:txBody>
+      </p:sp>
+    </p:spTree>
+    <p:extLst>
+      <p:ext uri="{BB962C8B-B14F-4D97-AF65-F5344CB8AC3E}">
+        <p14:creationId xmlns:p14="http://schemas.microsoft.com/office/powerpoint/2010/main" val="999952254"/>
       </p:ext>
     </p:extLst>
   </p:cSld>

</xml_diff>